<commit_message>
Work in October and November, 2020
</commit_message>
<xml_diff>
--- a/summary-2020-10a11/report.pptx
+++ b/summary-2020-10a11/report.pptx
@@ -3855,19 +3855,7 @@
               <a:rPr lang="en-US" altLang="zh-CN">
                 <a:sym typeface="+mn-ea"/>
               </a:rPr>
-              <a:t>	DQN (</a:t>
-            </a:r>
-            <a:r>
-              <a:rPr lang="en-US" altLang="zh-CN">
-                <a:sym typeface="+mn-ea"/>
-              </a:rPr>
-              <a:t>Deep Q-Networks</a:t>
-            </a:r>
-            <a:r>
-              <a:rPr lang="en-US" altLang="zh-CN">
-                <a:sym typeface="+mn-ea"/>
-              </a:rPr>
-              <a:t>)</a:t>
+              <a:t>	DQN (Deep Q-Networks)</a:t>
             </a:r>
             <a:r>
               <a:rPr lang="zh-CN" altLang="en-US">
@@ -3993,7 +3981,7 @@
             </a:r>
             <a:r>
               <a:rPr lang="en-US" altLang="zh-CN">
-                <a:hlinkClick r:id="rId1" tooltip="" action="ppaction://hlinkfile"/>
+                <a:hlinkClick r:id="rId1" action="ppaction://hlinkfile"/>
               </a:rPr>
               <a:t>gym.env</a:t>
             </a:r>
@@ -4009,12 +3997,12 @@
             </a:r>
             <a:r>
               <a:rPr lang="en-US" altLang="zh-CN">
-                <a:hlinkClick r:id="rId2" tooltip="" action="ppaction://hlinkfile"/>
+                <a:hlinkClick r:id="rId2" action="ppaction://hlinkfile"/>
               </a:rPr>
               <a:t>https://github.com/YueNing/tn_source_code</a:t>
             </a:r>
             <a:endParaRPr lang="en-US" altLang="zh-CN">
-              <a:hlinkClick r:id="rId2" tooltip="" action="ppaction://hlinkfile"/>
+              <a:hlinkClick r:id="rId2" action="ppaction://hlinkfile"/>
             </a:endParaRPr>
           </a:p>
           <a:p>

</xml_diff>